<commit_message>
Updated to Overview pptx
</commit_message>
<xml_diff>
--- a/docs/YasudaBot Overview.pptx
+++ b/docs/YasudaBot Overview.pptx
@@ -10,6 +10,8 @@
     <p:sldId id="258" r:id="rId4"/>
     <p:sldId id="259" r:id="rId5"/>
     <p:sldId id="260" r:id="rId6"/>
+    <p:sldId id="261" r:id="rId7"/>
+    <p:sldId id="262" r:id="rId8"/>
   </p:sldIdLst>
   <p:sldSz cx="12192000" cy="6858000"/>
   <p:notesSz cx="6858000" cy="9144000"/>
@@ -3103,7 +3105,44 @@
                 </a:rPr>
                 <a:t> Robbins</a:t>
               </a:r>
-              <a:endParaRPr kumimoji="0" lang="en-US" sz="2800" b="0" i="0" u="none" strike="noStrike" kern="1200" cap="none" spc="0" normalizeH="0" baseline="0" noProof="0" dirty="0">
+            </a:p>
+            <a:p>
+              <a:pPr marL="457200" marR="0" lvl="0" indent="0" algn="r" defTabSz="914400" rtl="0" eaLnBrk="1" fontAlgn="auto" latinLnBrk="0" hangingPunct="1">
+                <a:lnSpc>
+                  <a:spcPct val="100000"/>
+                </a:lnSpc>
+                <a:spcBef>
+                  <a:spcPts val="0"/>
+                </a:spcBef>
+                <a:spcAft>
+                  <a:spcPts val="0"/>
+                </a:spcAft>
+                <a:buClrTx/>
+                <a:buSzTx/>
+                <a:buFontTx/>
+                <a:buNone/>
+                <a:tabLst/>
+                <a:defRPr/>
+              </a:pPr>
+              <a:r>
+                <a:rPr lang="en-US" sz="2000" noProof="0" dirty="0">
+                  <a:solidFill>
+                    <a:prstClr val="white"/>
+                  </a:solidFill>
+                  <a:latin typeface="Calibri" panose="020F0502020204030204"/>
+                </a:rPr>
+                <a:t>DevOps &amp; </a:t>
+              </a:r>
+              <a:r>
+                <a:rPr lang="en-US" sz="2000" noProof="0" dirty="0" err="1">
+                  <a:solidFill>
+                    <a:prstClr val="white"/>
+                  </a:solidFill>
+                  <a:latin typeface="Calibri" panose="020F0502020204030204"/>
+                </a:rPr>
+                <a:t>AzureML</a:t>
+              </a:r>
+              <a:endParaRPr kumimoji="0" lang="en-US" sz="2000" b="0" i="0" u="none" strike="noStrike" kern="1200" cap="none" spc="0" normalizeH="0" baseline="0" noProof="0" dirty="0">
                 <a:ln>
                   <a:noFill/>
                 </a:ln>
@@ -3114,8 +3153,6 @@
                 <a:uLnTx/>
                 <a:uFillTx/>
                 <a:latin typeface="Calibri" panose="020F0502020204030204"/>
-                <a:ea typeface="+mn-ea"/>
-                <a:cs typeface="+mn-cs"/>
               </a:endParaRPr>
             </a:p>
           </p:txBody>
@@ -3248,6 +3285,46 @@
                 <a:t>Daiyu Hatakeyama</a:t>
               </a:r>
             </a:p>
+            <a:p>
+              <a:pPr marL="457200" marR="0" lvl="0" indent="0" algn="r" defTabSz="914400" rtl="0" eaLnBrk="1" fontAlgn="auto" latinLnBrk="0" hangingPunct="1">
+                <a:lnSpc>
+                  <a:spcPct val="100000"/>
+                </a:lnSpc>
+                <a:spcBef>
+                  <a:spcPts val="0"/>
+                </a:spcBef>
+                <a:spcAft>
+                  <a:spcPts val="0"/>
+                </a:spcAft>
+                <a:buClrTx/>
+                <a:buSzTx/>
+                <a:buFontTx/>
+                <a:buNone/>
+                <a:tabLst/>
+                <a:defRPr/>
+              </a:pPr>
+              <a:r>
+                <a:rPr lang="en-US" sz="2000" dirty="0">
+                  <a:solidFill>
+                    <a:prstClr val="white"/>
+                  </a:solidFill>
+                  <a:latin typeface="Calibri" panose="020F0502020204030204"/>
+                </a:rPr>
+                <a:t>Bot Framework</a:t>
+              </a:r>
+              <a:endParaRPr kumimoji="0" lang="en-US" sz="2000" b="0" i="0" u="none" strike="noStrike" kern="1200" cap="none" spc="0" normalizeH="0" baseline="0" noProof="0" dirty="0">
+                <a:ln>
+                  <a:noFill/>
+                </a:ln>
+                <a:solidFill>
+                  <a:prstClr val="white"/>
+                </a:solidFill>
+                <a:effectLst/>
+                <a:uLnTx/>
+                <a:uFillTx/>
+                <a:latin typeface="Calibri" panose="020F0502020204030204"/>
+              </a:endParaRPr>
+            </a:p>
           </p:txBody>
         </p:sp>
         <p:pic>
@@ -3376,6 +3453,46 @@
                 </a:rPr>
                 <a:t>Tsuyoshi Matsuzaki</a:t>
               </a:r>
+            </a:p>
+            <a:p>
+              <a:pPr marL="457200" marR="0" lvl="0" indent="0" algn="r" defTabSz="914400" rtl="0" eaLnBrk="1" fontAlgn="auto" latinLnBrk="0" hangingPunct="1">
+                <a:lnSpc>
+                  <a:spcPct val="100000"/>
+                </a:lnSpc>
+                <a:spcBef>
+                  <a:spcPts val="0"/>
+                </a:spcBef>
+                <a:spcAft>
+                  <a:spcPts val="0"/>
+                </a:spcAft>
+                <a:buClrTx/>
+                <a:buSzTx/>
+                <a:buFontTx/>
+                <a:buNone/>
+                <a:tabLst/>
+                <a:defRPr/>
+              </a:pPr>
+              <a:r>
+                <a:rPr lang="en-US" sz="2000" dirty="0" err="1">
+                  <a:solidFill>
+                    <a:prstClr val="white"/>
+                  </a:solidFill>
+                  <a:latin typeface="Calibri" panose="020F0502020204030204"/>
+                </a:rPr>
+                <a:t>Microservices</a:t>
+              </a:r>
+              <a:endParaRPr kumimoji="0" lang="en-US" sz="2000" b="0" i="0" u="none" strike="noStrike" kern="1200" cap="none" spc="0" normalizeH="0" baseline="0" noProof="0" dirty="0">
+                <a:ln>
+                  <a:noFill/>
+                </a:ln>
+                <a:solidFill>
+                  <a:prstClr val="white"/>
+                </a:solidFill>
+                <a:effectLst/>
+                <a:uLnTx/>
+                <a:uFillTx/>
+                <a:latin typeface="Calibri" panose="020F0502020204030204"/>
+              </a:endParaRPr>
             </a:p>
           </p:txBody>
         </p:sp>
@@ -3536,6 +3653,55 @@
                 <a:latin typeface="Calibri" panose="020F0502020204030204"/>
                 <a:ea typeface="+mn-ea"/>
                 <a:cs typeface="+mn-cs"/>
+              </a:endParaRPr>
+            </a:p>
+            <a:p>
+              <a:pPr marL="457200" marR="0" lvl="0" indent="0" algn="r" defTabSz="914400" rtl="0" eaLnBrk="1" fontAlgn="auto" latinLnBrk="0" hangingPunct="1">
+                <a:lnSpc>
+                  <a:spcPct val="100000"/>
+                </a:lnSpc>
+                <a:spcBef>
+                  <a:spcPts val="0"/>
+                </a:spcBef>
+                <a:spcAft>
+                  <a:spcPts val="0"/>
+                </a:spcAft>
+                <a:buClrTx/>
+                <a:buSzTx/>
+                <a:buFontTx/>
+                <a:buNone/>
+                <a:tabLst/>
+                <a:defRPr/>
+              </a:pPr>
+              <a:r>
+                <a:rPr lang="en-US" sz="2000" noProof="0" dirty="0" err="1">
+                  <a:solidFill>
+                    <a:prstClr val="white"/>
+                  </a:solidFill>
+                  <a:latin typeface="Calibri" panose="020F0502020204030204"/>
+                </a:rPr>
+                <a:t>Xamarin</a:t>
+              </a:r>
+              <a:r>
+                <a:rPr lang="en-US" sz="2000" noProof="0" dirty="0">
+                  <a:solidFill>
+                    <a:prstClr val="white"/>
+                  </a:solidFill>
+                  <a:latin typeface="Calibri" panose="020F0502020204030204"/>
+                </a:rPr>
+                <a:t> Client</a:t>
+              </a:r>
+              <a:endParaRPr kumimoji="0" lang="en-US" sz="2000" b="0" i="0" u="none" strike="noStrike" kern="1200" cap="none" spc="0" normalizeH="0" baseline="0" noProof="0" dirty="0">
+                <a:ln>
+                  <a:noFill/>
+                </a:ln>
+                <a:solidFill>
+                  <a:prstClr val="white"/>
+                </a:solidFill>
+                <a:effectLst/>
+                <a:uLnTx/>
+                <a:uFillTx/>
+                <a:latin typeface="Calibri" panose="020F0502020204030204"/>
               </a:endParaRPr>
             </a:p>
           </p:txBody>
@@ -4427,11 +4593,23 @@
           </a:fontRef>
         </p:style>
         <p:txBody>
-          <a:bodyPr rtlCol="0" anchor="ctr"/>
+          <a:bodyPr rot="0" spcFirstLastPara="0" vertOverflow="overflow" horzOverflow="overflow" vert="horz" wrap="square" lIns="91440" tIns="45720" rIns="91440" bIns="45720" numCol="1" spcCol="0" rtlCol="0" fromWordArt="0" anchor="t" anchorCtr="0" forceAA="0" compatLnSpc="1">
+            <a:prstTxWarp prst="textNoShape">
+              <a:avLst/>
+            </a:prstTxWarp>
+            <a:noAutofit/>
+          </a:bodyPr>
           <a:lstStyle/>
           <a:p>
             <a:pPr algn="ctr"/>
-            <a:endParaRPr lang="en-US"/>
+            <a:r>
+              <a:rPr lang="en-US" dirty="0">
+                <a:solidFill>
+                  <a:schemeClr val="tx1"/>
+                </a:solidFill>
+              </a:rPr>
+              <a:t>Chat Client</a:t>
+            </a:r>
           </a:p>
         </p:txBody>
       </p:sp>
@@ -4470,8 +4648,8 @@
         </p:nvSpPr>
         <p:spPr>
           <a:xfrm>
-            <a:off x="381000" y="1748600"/>
-            <a:ext cx="1517072" cy="1979468"/>
+            <a:off x="381000" y="2561906"/>
+            <a:ext cx="1517072" cy="1601065"/>
           </a:xfrm>
           <a:prstGeom prst="rect">
             <a:avLst/>
@@ -4524,8 +4702,8 @@
         </p:nvSpPr>
         <p:spPr>
           <a:xfrm>
-            <a:off x="381000" y="3906446"/>
-            <a:ext cx="1517072" cy="1979468"/>
+            <a:off x="381000" y="4267297"/>
+            <a:ext cx="1517072" cy="1601065"/>
           </a:xfrm>
           <a:prstGeom prst="rect">
             <a:avLst/>
@@ -4836,11 +5014,36 @@
           </a:fontRef>
         </p:style>
         <p:txBody>
-          <a:bodyPr rtlCol="0" anchor="ctr"/>
+          <a:bodyPr rot="0" spcFirstLastPara="0" vertOverflow="overflow" horzOverflow="overflow" vert="horz" wrap="square" lIns="91440" tIns="45720" rIns="91440" bIns="45720" numCol="1" spcCol="0" rtlCol="0" fromWordArt="0" anchor="t" anchorCtr="0" forceAA="0" compatLnSpc="1">
+            <a:prstTxWarp prst="textNoShape">
+              <a:avLst/>
+            </a:prstTxWarp>
+            <a:noAutofit/>
+          </a:bodyPr>
           <a:lstStyle/>
           <a:p>
             <a:pPr algn="ctr"/>
-            <a:endParaRPr lang="en-US"/>
+            <a:r>
+              <a:rPr lang="en-US" dirty="0">
+                <a:solidFill>
+                  <a:schemeClr val="tx1"/>
+                </a:solidFill>
+              </a:rPr>
+              <a:t>Azure </a:t>
+            </a:r>
+            <a:r>
+              <a:rPr lang="en-US" dirty="0" err="1">
+                <a:solidFill>
+                  <a:schemeClr val="tx1"/>
+                </a:solidFill>
+              </a:rPr>
+              <a:t>AppService</a:t>
+            </a:r>
+            <a:endParaRPr lang="en-US" dirty="0">
+              <a:solidFill>
+                <a:schemeClr val="tx1"/>
+              </a:solidFill>
+            </a:endParaRPr>
           </a:p>
         </p:txBody>
       </p:sp>
@@ -5049,11 +5252,23 @@
           </a:fontRef>
         </p:style>
         <p:txBody>
-          <a:bodyPr rtlCol="0" anchor="ctr"/>
+          <a:bodyPr rot="0" spcFirstLastPara="0" vertOverflow="overflow" horzOverflow="overflow" vert="horz" wrap="square" lIns="91440" tIns="45720" rIns="91440" bIns="45720" numCol="1" spcCol="0" rtlCol="0" fromWordArt="0" anchor="t" anchorCtr="0" forceAA="0" compatLnSpc="1">
+            <a:prstTxWarp prst="textNoShape">
+              <a:avLst/>
+            </a:prstTxWarp>
+            <a:noAutofit/>
+          </a:bodyPr>
           <a:lstStyle/>
           <a:p>
             <a:pPr algn="ctr"/>
-            <a:endParaRPr lang="en-US"/>
+            <a:r>
+              <a:rPr lang="en-US" dirty="0">
+                <a:solidFill>
+                  <a:schemeClr val="tx1"/>
+                </a:solidFill>
+              </a:rPr>
+              <a:t>Azure Service Fabric</a:t>
+            </a:r>
           </a:p>
         </p:txBody>
       </p:sp>
@@ -5665,6 +5880,65 @@
           </a:p>
         </p:txBody>
       </p:sp>
+      <p:sp>
+        <p:nvSpPr>
+          <p:cNvPr id="50" name="TextBox 49"/>
+          <p:cNvSpPr txBox="1"/>
+          <p:nvPr/>
+        </p:nvSpPr>
+        <p:spPr>
+          <a:xfrm>
+            <a:off x="5912828" y="5629045"/>
+            <a:ext cx="856132" cy="307777"/>
+          </a:xfrm>
+          <a:prstGeom prst="rect">
+            <a:avLst/>
+          </a:prstGeom>
+          <a:noFill/>
+        </p:spPr>
+        <p:txBody>
+          <a:bodyPr wrap="none" rtlCol="0">
+            <a:spAutoFit/>
+          </a:bodyPr>
+          <a:lstStyle/>
+          <a:p>
+            <a:r>
+              <a:rPr lang="en-US" sz="1400" dirty="0"/>
+              <a:t>Web App</a:t>
+            </a:r>
+          </a:p>
+        </p:txBody>
+      </p:sp>
+      <p:pic>
+        <p:nvPicPr>
+          <p:cNvPr id="51" name="Picture 50" descr="File:Camera font awesome.svg - Wikimedia Commons"/>
+          <p:cNvPicPr>
+            <a:picLocks noChangeAspect="1"/>
+          </p:cNvPicPr>
+          <p:nvPr/>
+        </p:nvPicPr>
+        <p:blipFill>
+          <a:blip r:embed="rId5">
+            <a:extLst>
+              <a:ext uri="{28A0092B-C50C-407E-A947-70E740481C1C}">
+                <a14:useLocalDpi xmlns:a14="http://schemas.microsoft.com/office/drawing/2010/main" val="0"/>
+              </a:ext>
+            </a:extLst>
+          </a:blip>
+          <a:stretch>
+            <a:fillRect/>
+          </a:stretch>
+        </p:blipFill>
+        <p:spPr>
+          <a:xfrm>
+            <a:off x="849761" y="1864325"/>
+            <a:ext cx="579549" cy="579549"/>
+          </a:xfrm>
+          <a:prstGeom prst="rect">
+            <a:avLst/>
+          </a:prstGeom>
+        </p:spPr>
+      </p:pic>
     </p:spTree>
     <p:extLst>
       <p:ext uri="{BB962C8B-B14F-4D97-AF65-F5344CB8AC3E}">
@@ -6273,6 +6547,684 @@
     <p:extLst>
       <p:ext uri="{BB962C8B-B14F-4D97-AF65-F5344CB8AC3E}">
         <p14:creationId xmlns:p14="http://schemas.microsoft.com/office/powerpoint/2010/main" val="3404416269"/>
+      </p:ext>
+    </p:extLst>
+  </p:cSld>
+  <p:clrMapOvr>
+    <a:masterClrMapping/>
+  </p:clrMapOvr>
+</p:sld>
+</file>
+
+<file path=ppt/slides/slide6.xml><?xml version="1.0" encoding="utf-8"?>
+<p:sld xmlns:a="http://schemas.openxmlformats.org/drawingml/2006/main" xmlns:r="http://schemas.openxmlformats.org/officeDocument/2006/relationships" xmlns:p="http://schemas.openxmlformats.org/presentationml/2006/main">
+  <p:cSld>
+    <p:spTree>
+      <p:nvGrpSpPr>
+        <p:cNvPr id="1" name=""/>
+        <p:cNvGrpSpPr/>
+        <p:nvPr/>
+      </p:nvGrpSpPr>
+      <p:grpSpPr>
+        <a:xfrm>
+          <a:off x="0" y="0"/>
+          <a:ext cx="0" cy="0"/>
+          <a:chOff x="0" y="0"/>
+          <a:chExt cx="0" cy="0"/>
+        </a:xfrm>
+      </p:grpSpPr>
+      <p:sp>
+        <p:nvSpPr>
+          <p:cNvPr id="2" name="Title 1"/>
+          <p:cNvSpPr>
+            <a:spLocks noGrp="1"/>
+          </p:cNvSpPr>
+          <p:nvPr>
+            <p:ph type="title"/>
+          </p:nvPr>
+        </p:nvSpPr>
+        <p:spPr>
+          <a:xfrm>
+            <a:off x="838200" y="178383"/>
+            <a:ext cx="10515600" cy="768216"/>
+          </a:xfrm>
+        </p:spPr>
+        <p:txBody>
+          <a:bodyPr/>
+          <a:lstStyle/>
+          <a:p>
+            <a:r>
+              <a:rPr lang="en-US" dirty="0"/>
+              <a:t>DevOps</a:t>
+            </a:r>
+          </a:p>
+        </p:txBody>
+      </p:sp>
+      <p:pic>
+        <p:nvPicPr>
+          <p:cNvPr id="2050" name="Picture 2" descr="https://tse1.mm.bing.net/th?&amp;id=OIP.Mbb43e4f9f795dae00c2c27dc6d75150fH0&amp;w=300&amp;h=200&amp;c=0&amp;pid=1.9&amp;rs=0&amp;p=0&amp;r=0"/>
+          <p:cNvPicPr>
+            <a:picLocks noChangeAspect="1" noChangeArrowheads="1"/>
+          </p:cNvPicPr>
+          <p:nvPr/>
+        </p:nvPicPr>
+        <p:blipFill>
+          <a:blip r:embed="rId2">
+            <a:extLst>
+              <a:ext uri="{28A0092B-C50C-407E-A947-70E740481C1C}">
+                <a14:useLocalDpi xmlns:a14="http://schemas.microsoft.com/office/drawing/2010/main" val="0"/>
+              </a:ext>
+            </a:extLst>
+          </a:blip>
+          <a:srcRect/>
+          <a:stretch>
+            <a:fillRect/>
+          </a:stretch>
+        </p:blipFill>
+        <p:spPr bwMode="auto">
+          <a:xfrm>
+            <a:off x="358047" y="2536809"/>
+            <a:ext cx="2423912" cy="1615941"/>
+          </a:xfrm>
+          <a:prstGeom prst="rect">
+            <a:avLst/>
+          </a:prstGeom>
+          <a:noFill/>
+          <a:extLst>
+            <a:ext uri="{909E8E84-426E-40DD-AFC4-6F175D3DCCD1}">
+              <a14:hiddenFill xmlns:a14="http://schemas.microsoft.com/office/drawing/2010/main">
+                <a:solidFill>
+                  <a:srgbClr val="FFFFFF"/>
+                </a:solidFill>
+              </a14:hiddenFill>
+            </a:ext>
+          </a:extLst>
+        </p:spPr>
+      </p:pic>
+      <p:sp>
+        <p:nvSpPr>
+          <p:cNvPr id="4" name="Rectangle 3"/>
+          <p:cNvSpPr/>
+          <p:nvPr/>
+        </p:nvSpPr>
+        <p:spPr>
+          <a:xfrm>
+            <a:off x="628503" y="1808710"/>
+            <a:ext cx="2649170" cy="261610"/>
+          </a:xfrm>
+          <a:prstGeom prst="rect">
+            <a:avLst/>
+          </a:prstGeom>
+        </p:spPr>
+        <p:txBody>
+          <a:bodyPr wrap="square">
+            <a:spAutoFit/>
+          </a:bodyPr>
+          <a:lstStyle/>
+          <a:p>
+            <a:r>
+              <a:rPr lang="en-US" sz="1100" dirty="0"/>
+              <a:t>https://github.com/drewby/YasudaBot</a:t>
+            </a:r>
+          </a:p>
+        </p:txBody>
+      </p:sp>
+      <p:pic>
+        <p:nvPicPr>
+          <p:cNvPr id="2052" name="Picture 4" descr="https://tse1.mm.bing.net/th?&amp;id=OIP.M19238908b74c66f87c0e09a51b650156o0&amp;w=133&amp;h=132&amp;c=0&amp;pid=1.9&amp;rs=0&amp;p=0&amp;r=0"/>
+          <p:cNvPicPr>
+            <a:picLocks noChangeAspect="1" noChangeArrowheads="1"/>
+          </p:cNvPicPr>
+          <p:nvPr/>
+        </p:nvPicPr>
+        <p:blipFill>
+          <a:blip r:embed="rId3">
+            <a:extLst>
+              <a:ext uri="{28A0092B-C50C-407E-A947-70E740481C1C}">
+                <a14:useLocalDpi xmlns:a14="http://schemas.microsoft.com/office/drawing/2010/main" val="0"/>
+              </a:ext>
+            </a:extLst>
+          </a:blip>
+          <a:srcRect/>
+          <a:stretch>
+            <a:fillRect/>
+          </a:stretch>
+        </p:blipFill>
+        <p:spPr bwMode="auto">
+          <a:xfrm>
+            <a:off x="3796618" y="2536809"/>
+            <a:ext cx="1550431" cy="1550433"/>
+          </a:xfrm>
+          <a:prstGeom prst="rect">
+            <a:avLst/>
+          </a:prstGeom>
+          <a:noFill/>
+          <a:extLst>
+            <a:ext uri="{909E8E84-426E-40DD-AFC4-6F175D3DCCD1}">
+              <a14:hiddenFill xmlns:a14="http://schemas.microsoft.com/office/drawing/2010/main">
+                <a:solidFill>
+                  <a:srgbClr val="FFFFFF"/>
+                </a:solidFill>
+              </a14:hiddenFill>
+            </a:ext>
+          </a:extLst>
+        </p:spPr>
+      </p:pic>
+      <p:sp>
+        <p:nvSpPr>
+          <p:cNvPr id="5" name="TextBox 4"/>
+          <p:cNvSpPr txBox="1"/>
+          <p:nvPr/>
+        </p:nvSpPr>
+        <p:spPr>
+          <a:xfrm>
+            <a:off x="824247" y="1223935"/>
+            <a:ext cx="1793889" cy="584775"/>
+          </a:xfrm>
+          <a:prstGeom prst="rect">
+            <a:avLst/>
+          </a:prstGeom>
+          <a:noFill/>
+        </p:spPr>
+        <p:txBody>
+          <a:bodyPr wrap="none" rtlCol="0">
+            <a:spAutoFit/>
+          </a:bodyPr>
+          <a:lstStyle/>
+          <a:p>
+            <a:r>
+              <a:rPr lang="en-US" b="1" dirty="0"/>
+              <a:t>GitHub:</a:t>
+            </a:r>
+          </a:p>
+          <a:p>
+            <a:pPr marL="285750" indent="-285750">
+              <a:buFont typeface="Arial" panose="020B0604020202020204" pitchFamily="34" charset="0"/>
+              <a:buChar char="•"/>
+            </a:pPr>
+            <a:r>
+              <a:rPr lang="en-US" sz="1400" dirty="0"/>
+              <a:t>Source Repository</a:t>
+            </a:r>
+          </a:p>
+        </p:txBody>
+      </p:sp>
+      <p:sp>
+        <p:nvSpPr>
+          <p:cNvPr id="8" name="TextBox 7"/>
+          <p:cNvSpPr txBox="1"/>
+          <p:nvPr/>
+        </p:nvSpPr>
+        <p:spPr>
+          <a:xfrm>
+            <a:off x="3128298" y="1223935"/>
+            <a:ext cx="2887072" cy="1015663"/>
+          </a:xfrm>
+          <a:prstGeom prst="rect">
+            <a:avLst/>
+          </a:prstGeom>
+          <a:noFill/>
+        </p:spPr>
+        <p:txBody>
+          <a:bodyPr wrap="none" rtlCol="0">
+            <a:spAutoFit/>
+          </a:bodyPr>
+          <a:lstStyle/>
+          <a:p>
+            <a:r>
+              <a:rPr lang="en-US" b="1" dirty="0"/>
+              <a:t>Visual Studio Team Services:</a:t>
+            </a:r>
+          </a:p>
+          <a:p>
+            <a:pPr marL="285750" indent="-285750">
+              <a:buFont typeface="Arial" panose="020B0604020202020204" pitchFamily="34" charset="0"/>
+              <a:buChar char="•"/>
+            </a:pPr>
+            <a:r>
+              <a:rPr lang="en-US" sz="1400" dirty="0"/>
+              <a:t>Work tracking</a:t>
+            </a:r>
+          </a:p>
+          <a:p>
+            <a:pPr marL="285750" indent="-285750">
+              <a:buFont typeface="Arial" panose="020B0604020202020204" pitchFamily="34" charset="0"/>
+              <a:buChar char="•"/>
+            </a:pPr>
+            <a:r>
+              <a:rPr lang="en-US" sz="1400" dirty="0"/>
+              <a:t>Continuous Integration</a:t>
+            </a:r>
+          </a:p>
+          <a:p>
+            <a:pPr marL="285750" indent="-285750">
+              <a:buFont typeface="Arial" panose="020B0604020202020204" pitchFamily="34" charset="0"/>
+              <a:buChar char="•"/>
+            </a:pPr>
+            <a:r>
+              <a:rPr lang="en-US" sz="1400" dirty="0"/>
+              <a:t>Continuous Development</a:t>
+            </a:r>
+          </a:p>
+        </p:txBody>
+      </p:sp>
+      <p:sp>
+        <p:nvSpPr>
+          <p:cNvPr id="11" name="TextBox 10"/>
+          <p:cNvSpPr txBox="1"/>
+          <p:nvPr/>
+        </p:nvSpPr>
+        <p:spPr>
+          <a:xfrm>
+            <a:off x="6525532" y="1223935"/>
+            <a:ext cx="2471061" cy="1231106"/>
+          </a:xfrm>
+          <a:prstGeom prst="rect">
+            <a:avLst/>
+          </a:prstGeom>
+          <a:noFill/>
+        </p:spPr>
+        <p:txBody>
+          <a:bodyPr wrap="none" rtlCol="0">
+            <a:spAutoFit/>
+          </a:bodyPr>
+          <a:lstStyle/>
+          <a:p>
+            <a:r>
+              <a:rPr lang="en-US" b="1" dirty="0"/>
+              <a:t>Microsoft Azure:</a:t>
+            </a:r>
+          </a:p>
+          <a:p>
+            <a:pPr marL="285750" indent="-285750">
+              <a:buFont typeface="Arial" panose="020B0604020202020204" pitchFamily="34" charset="0"/>
+              <a:buChar char="•"/>
+            </a:pPr>
+            <a:r>
+              <a:rPr lang="en-US" sz="1400" dirty="0"/>
+              <a:t>Azure Resource Groups</a:t>
+            </a:r>
+          </a:p>
+          <a:p>
+            <a:pPr marL="285750" indent="-285750">
+              <a:buFont typeface="Arial" panose="020B0604020202020204" pitchFamily="34" charset="0"/>
+              <a:buChar char="•"/>
+            </a:pPr>
+            <a:r>
+              <a:rPr lang="en-US" sz="1400" dirty="0"/>
+              <a:t>Traffic Manager – Hot swap</a:t>
+            </a:r>
+          </a:p>
+          <a:p>
+            <a:pPr marL="285750" indent="-285750">
+              <a:buFont typeface="Arial" panose="020B0604020202020204" pitchFamily="34" charset="0"/>
+              <a:buChar char="•"/>
+            </a:pPr>
+            <a:r>
+              <a:rPr lang="en-US" sz="1400" dirty="0"/>
+              <a:t>Application Insights</a:t>
+            </a:r>
+          </a:p>
+          <a:p>
+            <a:pPr marL="285750" indent="-285750">
+              <a:buFont typeface="Arial" panose="020B0604020202020204" pitchFamily="34" charset="0"/>
+              <a:buChar char="•"/>
+            </a:pPr>
+            <a:r>
+              <a:rPr lang="en-US" sz="1400" dirty="0"/>
+              <a:t>Service Fabric Explorer</a:t>
+            </a:r>
+          </a:p>
+        </p:txBody>
+      </p:sp>
+      <p:pic>
+        <p:nvPicPr>
+          <p:cNvPr id="2054" name="Picture 6" descr="https://tse1.mm.bing.net/th?&amp;id=OIP.M31ef05ac97efa77e351a9840ddaf332co0&amp;w=300&amp;h=150&amp;c=0&amp;pid=1.9&amp;rs=0&amp;p=0&amp;r=0"/>
+          <p:cNvPicPr>
+            <a:picLocks noChangeAspect="1" noChangeArrowheads="1"/>
+          </p:cNvPicPr>
+          <p:nvPr/>
+        </p:nvPicPr>
+        <p:blipFill>
+          <a:blip r:embed="rId4">
+            <a:extLst>
+              <a:ext uri="{28A0092B-C50C-407E-A947-70E740481C1C}">
+                <a14:useLocalDpi xmlns:a14="http://schemas.microsoft.com/office/drawing/2010/main" val="0"/>
+              </a:ext>
+            </a:extLst>
+          </a:blip>
+          <a:srcRect/>
+          <a:stretch>
+            <a:fillRect/>
+          </a:stretch>
+        </p:blipFill>
+        <p:spPr bwMode="auto">
+          <a:xfrm>
+            <a:off x="6716988" y="2822742"/>
+            <a:ext cx="2088148" cy="1044074"/>
+          </a:xfrm>
+          <a:prstGeom prst="rect">
+            <a:avLst/>
+          </a:prstGeom>
+          <a:noFill/>
+          <a:extLst>
+            <a:ext uri="{909E8E84-426E-40DD-AFC4-6F175D3DCCD1}">
+              <a14:hiddenFill xmlns:a14="http://schemas.microsoft.com/office/drawing/2010/main">
+                <a:solidFill>
+                  <a:srgbClr val="FFFFFF"/>
+                </a:solidFill>
+              </a14:hiddenFill>
+            </a:ext>
+          </a:extLst>
+        </p:spPr>
+      </p:pic>
+      <p:sp>
+        <p:nvSpPr>
+          <p:cNvPr id="13" name="TextBox 12"/>
+          <p:cNvSpPr txBox="1"/>
+          <p:nvPr/>
+        </p:nvSpPr>
+        <p:spPr>
+          <a:xfrm>
+            <a:off x="9506755" y="1223935"/>
+            <a:ext cx="1873911" cy="800219"/>
+          </a:xfrm>
+          <a:prstGeom prst="rect">
+            <a:avLst/>
+          </a:prstGeom>
+          <a:noFill/>
+        </p:spPr>
+        <p:txBody>
+          <a:bodyPr wrap="none" rtlCol="0">
+            <a:spAutoFit/>
+          </a:bodyPr>
+          <a:lstStyle/>
+          <a:p>
+            <a:r>
+              <a:rPr lang="en-US" b="1" dirty="0"/>
+              <a:t>Other:</a:t>
+            </a:r>
+          </a:p>
+          <a:p>
+            <a:pPr marL="285750" indent="-285750">
+              <a:buFont typeface="Arial" panose="020B0604020202020204" pitchFamily="34" charset="0"/>
+              <a:buChar char="•"/>
+            </a:pPr>
+            <a:r>
+              <a:rPr lang="en-US" sz="1400" dirty="0" err="1"/>
+              <a:t>Xamarin</a:t>
+            </a:r>
+            <a:r>
+              <a:rPr lang="en-US" sz="1400" dirty="0"/>
+              <a:t> Test Cloud</a:t>
+            </a:r>
+          </a:p>
+          <a:p>
+            <a:pPr marL="285750" indent="-285750">
+              <a:buFont typeface="Arial" panose="020B0604020202020204" pitchFamily="34" charset="0"/>
+              <a:buChar char="•"/>
+            </a:pPr>
+            <a:r>
+              <a:rPr lang="en-US" sz="1400" dirty="0" err="1"/>
+              <a:t>HockeyApp</a:t>
+            </a:r>
+            <a:endParaRPr lang="en-US" sz="1400" dirty="0"/>
+          </a:p>
+        </p:txBody>
+      </p:sp>
+      <p:pic>
+        <p:nvPicPr>
+          <p:cNvPr id="2056" name="Picture 8" descr="https://tse1.mm.bing.net/th?&amp;id=OIP.Mf5832895ddf073ad81116c0eda2bba83o0&amp;w=300&amp;h=154&amp;c=0&amp;pid=1.9&amp;rs=0&amp;p=0&amp;r=0"/>
+          <p:cNvPicPr>
+            <a:picLocks noChangeAspect="1" noChangeArrowheads="1"/>
+          </p:cNvPicPr>
+          <p:nvPr/>
+        </p:nvPicPr>
+        <p:blipFill>
+          <a:blip r:embed="rId5">
+            <a:extLst>
+              <a:ext uri="{28A0092B-C50C-407E-A947-70E740481C1C}">
+                <a14:useLocalDpi xmlns:a14="http://schemas.microsoft.com/office/drawing/2010/main" val="0"/>
+              </a:ext>
+            </a:extLst>
+          </a:blip>
+          <a:srcRect/>
+          <a:stretch>
+            <a:fillRect/>
+          </a:stretch>
+        </p:blipFill>
+        <p:spPr bwMode="auto">
+          <a:xfrm>
+            <a:off x="9659154" y="2350097"/>
+            <a:ext cx="1643889" cy="843864"/>
+          </a:xfrm>
+          <a:prstGeom prst="rect">
+            <a:avLst/>
+          </a:prstGeom>
+          <a:noFill/>
+          <a:extLst>
+            <a:ext uri="{909E8E84-426E-40DD-AFC4-6F175D3DCCD1}">
+              <a14:hiddenFill xmlns:a14="http://schemas.microsoft.com/office/drawing/2010/main">
+                <a:solidFill>
+                  <a:srgbClr val="FFFFFF"/>
+                </a:solidFill>
+              </a14:hiddenFill>
+            </a:ext>
+          </a:extLst>
+        </p:spPr>
+      </p:pic>
+      <p:pic>
+        <p:nvPicPr>
+          <p:cNvPr id="2058" name="Picture 10" descr="https://tse1.mm.bing.net/th?&amp;id=OIP.Ma6201714f319430eabeffcecc30a0c06o0&amp;w=304&amp;h=73&amp;c=0&amp;pid=1.9&amp;rs=0&amp;p=0&amp;r=0"/>
+          <p:cNvPicPr>
+            <a:picLocks noChangeAspect="1" noChangeArrowheads="1"/>
+          </p:cNvPicPr>
+          <p:nvPr/>
+        </p:nvPicPr>
+        <p:blipFill>
+          <a:blip r:embed="rId6">
+            <a:extLst>
+              <a:ext uri="{28A0092B-C50C-407E-A947-70E740481C1C}">
+                <a14:useLocalDpi xmlns:a14="http://schemas.microsoft.com/office/drawing/2010/main" val="0"/>
+              </a:ext>
+            </a:extLst>
+          </a:blip>
+          <a:srcRect/>
+          <a:stretch>
+            <a:fillRect/>
+          </a:stretch>
+        </p:blipFill>
+        <p:spPr bwMode="auto">
+          <a:xfrm>
+            <a:off x="9509900" y="3417832"/>
+            <a:ext cx="1870766" cy="448984"/>
+          </a:xfrm>
+          <a:prstGeom prst="rect">
+            <a:avLst/>
+          </a:prstGeom>
+          <a:noFill/>
+          <a:extLst>
+            <a:ext uri="{909E8E84-426E-40DD-AFC4-6F175D3DCCD1}">
+              <a14:hiddenFill xmlns:a14="http://schemas.microsoft.com/office/drawing/2010/main">
+                <a:solidFill>
+                  <a:srgbClr val="FFFFFF"/>
+                </a:solidFill>
+              </a14:hiddenFill>
+            </a:ext>
+          </a:extLst>
+        </p:spPr>
+      </p:pic>
+      <p:pic>
+        <p:nvPicPr>
+          <p:cNvPr id="6" name="Picture 5"/>
+          <p:cNvPicPr>
+            <a:picLocks noChangeAspect="1"/>
+          </p:cNvPicPr>
+          <p:nvPr/>
+        </p:nvPicPr>
+        <p:blipFill>
+          <a:blip r:embed="rId7"/>
+          <a:stretch>
+            <a:fillRect/>
+          </a:stretch>
+        </p:blipFill>
+        <p:spPr>
+          <a:xfrm>
+            <a:off x="7380995" y="4785085"/>
+            <a:ext cx="2125760" cy="1335643"/>
+          </a:xfrm>
+          <a:prstGeom prst="rect">
+            <a:avLst/>
+          </a:prstGeom>
+        </p:spPr>
+      </p:pic>
+      <p:pic>
+        <p:nvPicPr>
+          <p:cNvPr id="7" name="Picture 6"/>
+          <p:cNvPicPr>
+            <a:picLocks noChangeAspect="1"/>
+          </p:cNvPicPr>
+          <p:nvPr/>
+        </p:nvPicPr>
+        <p:blipFill>
+          <a:blip r:embed="rId8"/>
+          <a:stretch>
+            <a:fillRect/>
+          </a:stretch>
+        </p:blipFill>
+        <p:spPr>
+          <a:xfrm>
+            <a:off x="2710714" y="4346704"/>
+            <a:ext cx="1861119" cy="2247282"/>
+          </a:xfrm>
+          <a:prstGeom prst="rect">
+            <a:avLst/>
+          </a:prstGeom>
+        </p:spPr>
+      </p:pic>
+      <p:pic>
+        <p:nvPicPr>
+          <p:cNvPr id="12" name="Picture 11"/>
+          <p:cNvPicPr>
+            <a:picLocks noChangeAspect="1"/>
+          </p:cNvPicPr>
+          <p:nvPr/>
+        </p:nvPicPr>
+        <p:blipFill>
+          <a:blip r:embed="rId9"/>
+          <a:stretch>
+            <a:fillRect/>
+          </a:stretch>
+        </p:blipFill>
+        <p:spPr>
+          <a:xfrm>
+            <a:off x="5006605" y="4384453"/>
+            <a:ext cx="2178790" cy="2171784"/>
+          </a:xfrm>
+          <a:prstGeom prst="rect">
+            <a:avLst/>
+          </a:prstGeom>
+        </p:spPr>
+      </p:pic>
+      <p:pic>
+        <p:nvPicPr>
+          <p:cNvPr id="14" name="Picture 13"/>
+          <p:cNvPicPr>
+            <a:picLocks noChangeAspect="1"/>
+          </p:cNvPicPr>
+          <p:nvPr/>
+        </p:nvPicPr>
+        <p:blipFill>
+          <a:blip r:embed="rId10"/>
+          <a:stretch>
+            <a:fillRect/>
+          </a:stretch>
+        </p:blipFill>
+        <p:spPr>
+          <a:xfrm>
+            <a:off x="119153" y="4785085"/>
+            <a:ext cx="2394793" cy="1209565"/>
+          </a:xfrm>
+          <a:prstGeom prst="rect">
+            <a:avLst/>
+          </a:prstGeom>
+        </p:spPr>
+      </p:pic>
+    </p:spTree>
+    <p:extLst>
+      <p:ext uri="{BB962C8B-B14F-4D97-AF65-F5344CB8AC3E}">
+        <p14:creationId xmlns:p14="http://schemas.microsoft.com/office/powerpoint/2010/main" val="2652383592"/>
+      </p:ext>
+    </p:extLst>
+  </p:cSld>
+  <p:clrMapOvr>
+    <a:masterClrMapping/>
+  </p:clrMapOvr>
+</p:sld>
+</file>
+
+<file path=ppt/slides/slide7.xml><?xml version="1.0" encoding="utf-8"?>
+<p:sld xmlns:a="http://schemas.openxmlformats.org/drawingml/2006/main" xmlns:r="http://schemas.openxmlformats.org/officeDocument/2006/relationships" xmlns:p="http://schemas.openxmlformats.org/presentationml/2006/main">
+  <p:cSld>
+    <p:spTree>
+      <p:nvGrpSpPr>
+        <p:cNvPr id="1" name=""/>
+        <p:cNvGrpSpPr/>
+        <p:nvPr/>
+      </p:nvGrpSpPr>
+      <p:grpSpPr>
+        <a:xfrm>
+          <a:off x="0" y="0"/>
+          <a:ext cx="0" cy="0"/>
+          <a:chOff x="0" y="0"/>
+          <a:chExt cx="0" cy="0"/>
+        </a:xfrm>
+      </p:grpSpPr>
+      <p:sp>
+        <p:nvSpPr>
+          <p:cNvPr id="2" name="Title 1"/>
+          <p:cNvSpPr>
+            <a:spLocks noGrp="1"/>
+          </p:cNvSpPr>
+          <p:nvPr>
+            <p:ph type="title"/>
+          </p:nvPr>
+        </p:nvSpPr>
+        <p:spPr/>
+        <p:txBody>
+          <a:bodyPr/>
+          <a:lstStyle/>
+          <a:p>
+            <a:r>
+              <a:rPr lang="en-US" dirty="0"/>
+              <a:t>Learnings</a:t>
+            </a:r>
+          </a:p>
+        </p:txBody>
+      </p:sp>
+      <p:sp>
+        <p:nvSpPr>
+          <p:cNvPr id="3" name="Content Placeholder 2"/>
+          <p:cNvSpPr>
+            <a:spLocks noGrp="1"/>
+          </p:cNvSpPr>
+          <p:nvPr>
+            <p:ph idx="1"/>
+          </p:nvPr>
+        </p:nvSpPr>
+        <p:spPr/>
+        <p:txBody>
+          <a:bodyPr/>
+          <a:lstStyle/>
+          <a:p>
+            <a:endParaRPr lang="en-US"/>
+          </a:p>
+        </p:txBody>
+      </p:sp>
+    </p:spTree>
+    <p:extLst>
+      <p:ext uri="{BB962C8B-B14F-4D97-AF65-F5344CB8AC3E}">
+        <p14:creationId xmlns:p14="http://schemas.microsoft.com/office/powerpoint/2010/main" val="745661043"/>
       </p:ext>
     </p:extLst>
   </p:cSld>

</xml_diff>

<commit_message>
Updates to overview pptx
</commit_message>
<xml_diff>
--- a/docs/YasudaBot Overview.pptx
+++ b/docs/YasudaBot Overview.pptx
@@ -5734,8 +5734,8 @@
         </p:nvSpPr>
         <p:spPr>
           <a:xfrm>
-            <a:off x="9980373" y="4836526"/>
-            <a:ext cx="1551905" cy="1004552"/>
+            <a:off x="9980374" y="4836526"/>
+            <a:ext cx="768782" cy="1004552"/>
           </a:xfrm>
           <a:prstGeom prst="rect">
             <a:avLst/>
@@ -5763,9 +5763,10 @@
           <a:p>
             <a:pPr algn="ctr"/>
             <a:r>
-              <a:rPr lang="en-US" dirty="0"/>
-              <a:t>Emotion API</a:t>
-            </a:r>
+              <a:rPr lang="en-US" sz="1600" dirty="0" err="1"/>
+              <a:t>AzureML</a:t>
+            </a:r>
+            <a:endParaRPr lang="en-US" sz="1600" dirty="0"/>
           </a:p>
         </p:txBody>
       </p:sp>
@@ -5810,18 +5811,13 @@
           <a:p>
             <a:pPr algn="ctr"/>
             <a:r>
-              <a:rPr lang="en-US" dirty="0" err="1">
+              <a:rPr lang="en-US" dirty="0">
                 <a:solidFill>
                   <a:schemeClr val="tx1"/>
                 </a:solidFill>
               </a:rPr>
-              <a:t>AzureML</a:t>
-            </a:r>
-            <a:endParaRPr lang="en-US" dirty="0">
-              <a:solidFill>
-                <a:schemeClr val="tx1"/>
-              </a:solidFill>
-            </a:endParaRPr>
+              <a:t>Analysis</a:t>
+            </a:r>
           </a:p>
         </p:txBody>
       </p:sp>
@@ -5924,6 +5920,49 @@
           </a:prstGeom>
         </p:spPr>
       </p:pic>
+      <p:sp>
+        <p:nvSpPr>
+          <p:cNvPr id="36" name="Rectangle 35"/>
+          <p:cNvSpPr/>
+          <p:nvPr/>
+        </p:nvSpPr>
+        <p:spPr>
+          <a:xfrm>
+            <a:off x="10857037" y="4821763"/>
+            <a:ext cx="768782" cy="1004552"/>
+          </a:xfrm>
+          <a:prstGeom prst="rect">
+            <a:avLst/>
+          </a:prstGeom>
+        </p:spPr>
+        <p:style>
+          <a:lnRef idx="2">
+            <a:schemeClr val="accent1">
+              <a:shade val="50000"/>
+            </a:schemeClr>
+          </a:lnRef>
+          <a:fillRef idx="1">
+            <a:schemeClr val="accent1"/>
+          </a:fillRef>
+          <a:effectRef idx="0">
+            <a:schemeClr val="accent1"/>
+          </a:effectRef>
+          <a:fontRef idx="minor">
+            <a:schemeClr val="lt1"/>
+          </a:fontRef>
+        </p:style>
+        <p:txBody>
+          <a:bodyPr rtlCol="0" anchor="ctr"/>
+          <a:lstStyle/>
+          <a:p>
+            <a:pPr algn="ctr"/>
+            <a:r>
+              <a:rPr lang="en-US" sz="1600" dirty="0"/>
+              <a:t>Power BI</a:t>
+            </a:r>
+          </a:p>
+        </p:txBody>
+      </p:sp>
     </p:spTree>
     <p:extLst>
       <p:ext uri="{BB962C8B-B14F-4D97-AF65-F5344CB8AC3E}">

</xml_diff>

<commit_message>
update to overview pptx
</commit_message>
<xml_diff>
--- a/docs/YasudaBot Overview.pptx
+++ b/docs/YasudaBot Overview.pptx
@@ -3746,335 +3746,6 @@
   <p:clrMapOvr>
     <a:masterClrMapping/>
   </p:clrMapOvr>
-  <p:timing>
-    <p:tnLst>
-      <p:par>
-        <p:cTn id="1" dur="indefinite" restart="never" nodeType="tmRoot">
-          <p:childTnLst>
-            <p:seq concurrent="1" nextAc="seek">
-              <p:cTn id="2" dur="indefinite" nodeType="mainSeq">
-                <p:childTnLst>
-                  <p:par>
-                    <p:cTn id="3" fill="hold">
-                      <p:stCondLst>
-                        <p:cond delay="indefinite"/>
-                        <p:cond evt="onBegin" delay="0">
-                          <p:tn val="2"/>
-                        </p:cond>
-                      </p:stCondLst>
-                      <p:childTnLst>
-                        <p:par>
-                          <p:cTn id="4" fill="hold">
-                            <p:stCondLst>
-                              <p:cond delay="0"/>
-                            </p:stCondLst>
-                            <p:childTnLst>
-                              <p:par>
-                                <p:cTn id="5" presetID="26" presetClass="entr" presetSubtype="0" fill="hold" nodeType="afterEffect">
-                                  <p:stCondLst>
-                                    <p:cond delay="0"/>
-                                  </p:stCondLst>
-                                  <p:childTnLst>
-                                    <p:set>
-                                      <p:cBhvr>
-                                        <p:cTn id="6" dur="1" fill="hold">
-                                          <p:stCondLst>
-                                            <p:cond delay="0"/>
-                                          </p:stCondLst>
-                                        </p:cTn>
-                                        <p:tgtEl>
-                                          <p:spTgt spid="8"/>
-                                        </p:tgtEl>
-                                        <p:attrNameLst>
-                                          <p:attrName>style.visibility</p:attrName>
-                                        </p:attrNameLst>
-                                      </p:cBhvr>
-                                      <p:to>
-                                        <p:strVal val="visible"/>
-                                      </p:to>
-                                    </p:set>
-                                    <p:animEffect transition="in" filter="wipe(down)">
-                                      <p:cBhvr>
-                                        <p:cTn id="7" dur="580">
-                                          <p:stCondLst>
-                                            <p:cond delay="0"/>
-                                          </p:stCondLst>
-                                        </p:cTn>
-                                        <p:tgtEl>
-                                          <p:spTgt spid="8"/>
-                                        </p:tgtEl>
-                                      </p:cBhvr>
-                                    </p:animEffect>
-                                    <p:anim calcmode="lin" valueType="num">
-                                      <p:cBhvr>
-                                        <p:cTn id="8" dur="1822" tmFilter="0,0; 0.14,0.36; 0.43,0.73; 0.71,0.91; 1.0,1.0">
-                                          <p:stCondLst>
-                                            <p:cond delay="0"/>
-                                          </p:stCondLst>
-                                        </p:cTn>
-                                        <p:tgtEl>
-                                          <p:spTgt spid="8"/>
-                                        </p:tgtEl>
-                                        <p:attrNameLst>
-                                          <p:attrName>ppt_x</p:attrName>
-                                        </p:attrNameLst>
-                                      </p:cBhvr>
-                                      <p:tavLst>
-                                        <p:tav tm="0">
-                                          <p:val>
-                                            <p:strVal val="#ppt_x-0.25"/>
-                                          </p:val>
-                                        </p:tav>
-                                        <p:tav tm="100000">
-                                          <p:val>
-                                            <p:strVal val="#ppt_x"/>
-                                          </p:val>
-                                        </p:tav>
-                                      </p:tavLst>
-                                    </p:anim>
-                                    <p:anim calcmode="lin" valueType="num">
-                                      <p:cBhvr>
-                                        <p:cTn id="9" dur="664" tmFilter="0.0,0.0; 0.25,0.07; 0.50,0.2; 0.75,0.467; 1.0,1.0">
-                                          <p:stCondLst>
-                                            <p:cond delay="0"/>
-                                          </p:stCondLst>
-                                        </p:cTn>
-                                        <p:tgtEl>
-                                          <p:spTgt spid="8"/>
-                                        </p:tgtEl>
-                                        <p:attrNameLst>
-                                          <p:attrName>ppt_y</p:attrName>
-                                        </p:attrNameLst>
-                                      </p:cBhvr>
-                                      <p:tavLst>
-                                        <p:tav tm="0" fmla="#ppt_y-sin(pi*$)/3">
-                                          <p:val>
-                                            <p:fltVal val="0.5"/>
-                                          </p:val>
-                                        </p:tav>
-                                        <p:tav tm="100000">
-                                          <p:val>
-                                            <p:fltVal val="1"/>
-                                          </p:val>
-                                        </p:tav>
-                                      </p:tavLst>
-                                    </p:anim>
-                                    <p:anim calcmode="lin" valueType="num">
-                                      <p:cBhvr>
-                                        <p:cTn id="10" dur="664" tmFilter="0, 0; 0.125,0.2665; 0.25,0.4; 0.375,0.465; 0.5,0.5;  0.625,0.535; 0.75,0.6; 0.875,0.7335; 1,1">
-                                          <p:stCondLst>
-                                            <p:cond delay="664"/>
-                                          </p:stCondLst>
-                                        </p:cTn>
-                                        <p:tgtEl>
-                                          <p:spTgt spid="8"/>
-                                        </p:tgtEl>
-                                        <p:attrNameLst>
-                                          <p:attrName>ppt_y</p:attrName>
-                                        </p:attrNameLst>
-                                      </p:cBhvr>
-                                      <p:tavLst>
-                                        <p:tav tm="0" fmla="#ppt_y-sin(pi*$)/9">
-                                          <p:val>
-                                            <p:fltVal val="0"/>
-                                          </p:val>
-                                        </p:tav>
-                                        <p:tav tm="100000">
-                                          <p:val>
-                                            <p:fltVal val="1"/>
-                                          </p:val>
-                                        </p:tav>
-                                      </p:tavLst>
-                                    </p:anim>
-                                    <p:anim calcmode="lin" valueType="num">
-                                      <p:cBhvr>
-                                        <p:cTn id="11" dur="332" tmFilter="0, 0; 0.125,0.2665; 0.25,0.4; 0.375,0.465; 0.5,0.5;  0.625,0.535; 0.75,0.6; 0.875,0.7335; 1,1">
-                                          <p:stCondLst>
-                                            <p:cond delay="1324"/>
-                                          </p:stCondLst>
-                                        </p:cTn>
-                                        <p:tgtEl>
-                                          <p:spTgt spid="8"/>
-                                        </p:tgtEl>
-                                        <p:attrNameLst>
-                                          <p:attrName>ppt_y</p:attrName>
-                                        </p:attrNameLst>
-                                      </p:cBhvr>
-                                      <p:tavLst>
-                                        <p:tav tm="0" fmla="#ppt_y-sin(pi*$)/27">
-                                          <p:val>
-                                            <p:fltVal val="0"/>
-                                          </p:val>
-                                        </p:tav>
-                                        <p:tav tm="100000">
-                                          <p:val>
-                                            <p:fltVal val="1"/>
-                                          </p:val>
-                                        </p:tav>
-                                      </p:tavLst>
-                                    </p:anim>
-                                    <p:anim calcmode="lin" valueType="num">
-                                      <p:cBhvr>
-                                        <p:cTn id="12" dur="164" tmFilter="0, 0; 0.125,0.2665; 0.25,0.4; 0.375,0.465; 0.5,0.5;  0.625,0.535; 0.75,0.6; 0.875,0.7335; 1,1">
-                                          <p:stCondLst>
-                                            <p:cond delay="1656"/>
-                                          </p:stCondLst>
-                                        </p:cTn>
-                                        <p:tgtEl>
-                                          <p:spTgt spid="8"/>
-                                        </p:tgtEl>
-                                        <p:attrNameLst>
-                                          <p:attrName>ppt_y</p:attrName>
-                                        </p:attrNameLst>
-                                      </p:cBhvr>
-                                      <p:tavLst>
-                                        <p:tav tm="0" fmla="#ppt_y-sin(pi*$)/81">
-                                          <p:val>
-                                            <p:fltVal val="0"/>
-                                          </p:val>
-                                        </p:tav>
-                                        <p:tav tm="100000">
-                                          <p:val>
-                                            <p:fltVal val="1"/>
-                                          </p:val>
-                                        </p:tav>
-                                      </p:tavLst>
-                                    </p:anim>
-                                    <p:animScale>
-                                      <p:cBhvr>
-                                        <p:cTn id="13" dur="26">
-                                          <p:stCondLst>
-                                            <p:cond delay="650"/>
-                                          </p:stCondLst>
-                                        </p:cTn>
-                                        <p:tgtEl>
-                                          <p:spTgt spid="8"/>
-                                        </p:tgtEl>
-                                      </p:cBhvr>
-                                      <p:to x="100000" y="60000"/>
-                                    </p:animScale>
-                                    <p:animScale>
-                                      <p:cBhvr>
-                                        <p:cTn id="14" dur="166" decel="50000">
-                                          <p:stCondLst>
-                                            <p:cond delay="676"/>
-                                          </p:stCondLst>
-                                        </p:cTn>
-                                        <p:tgtEl>
-                                          <p:spTgt spid="8"/>
-                                        </p:tgtEl>
-                                      </p:cBhvr>
-                                      <p:to x="100000" y="100000"/>
-                                    </p:animScale>
-                                    <p:animScale>
-                                      <p:cBhvr>
-                                        <p:cTn id="15" dur="26">
-                                          <p:stCondLst>
-                                            <p:cond delay="1312"/>
-                                          </p:stCondLst>
-                                        </p:cTn>
-                                        <p:tgtEl>
-                                          <p:spTgt spid="8"/>
-                                        </p:tgtEl>
-                                      </p:cBhvr>
-                                      <p:to x="100000" y="80000"/>
-                                    </p:animScale>
-                                    <p:animScale>
-                                      <p:cBhvr>
-                                        <p:cTn id="16" dur="166" decel="50000">
-                                          <p:stCondLst>
-                                            <p:cond delay="1338"/>
-                                          </p:stCondLst>
-                                        </p:cTn>
-                                        <p:tgtEl>
-                                          <p:spTgt spid="8"/>
-                                        </p:tgtEl>
-                                      </p:cBhvr>
-                                      <p:to x="100000" y="100000"/>
-                                    </p:animScale>
-                                    <p:animScale>
-                                      <p:cBhvr>
-                                        <p:cTn id="17" dur="26">
-                                          <p:stCondLst>
-                                            <p:cond delay="1642"/>
-                                          </p:stCondLst>
-                                        </p:cTn>
-                                        <p:tgtEl>
-                                          <p:spTgt spid="8"/>
-                                        </p:tgtEl>
-                                      </p:cBhvr>
-                                      <p:to x="100000" y="90000"/>
-                                    </p:animScale>
-                                    <p:animScale>
-                                      <p:cBhvr>
-                                        <p:cTn id="18" dur="166" decel="50000">
-                                          <p:stCondLst>
-                                            <p:cond delay="1668"/>
-                                          </p:stCondLst>
-                                        </p:cTn>
-                                        <p:tgtEl>
-                                          <p:spTgt spid="8"/>
-                                        </p:tgtEl>
-                                      </p:cBhvr>
-                                      <p:to x="100000" y="100000"/>
-                                    </p:animScale>
-                                    <p:animScale>
-                                      <p:cBhvr>
-                                        <p:cTn id="19" dur="26">
-                                          <p:stCondLst>
-                                            <p:cond delay="1808"/>
-                                          </p:stCondLst>
-                                        </p:cTn>
-                                        <p:tgtEl>
-                                          <p:spTgt spid="8"/>
-                                        </p:tgtEl>
-                                      </p:cBhvr>
-                                      <p:to x="100000" y="95000"/>
-                                    </p:animScale>
-                                    <p:animScale>
-                                      <p:cBhvr>
-                                        <p:cTn id="20" dur="166" decel="50000">
-                                          <p:stCondLst>
-                                            <p:cond delay="1834"/>
-                                          </p:stCondLst>
-                                        </p:cTn>
-                                        <p:tgtEl>
-                                          <p:spTgt spid="8"/>
-                                        </p:tgtEl>
-                                      </p:cBhvr>
-                                      <p:to x="100000" y="100000"/>
-                                    </p:animScale>
-                                  </p:childTnLst>
-                                </p:cTn>
-                              </p:par>
-                            </p:childTnLst>
-                          </p:cTn>
-                        </p:par>
-                      </p:childTnLst>
-                    </p:cTn>
-                  </p:par>
-                </p:childTnLst>
-              </p:cTn>
-              <p:prevCondLst>
-                <p:cond evt="onPrev" delay="0">
-                  <p:tgtEl>
-                    <p:sldTgt/>
-                  </p:tgtEl>
-                </p:cond>
-              </p:prevCondLst>
-              <p:nextCondLst>
-                <p:cond evt="onNext" delay="0">
-                  <p:tgtEl>
-                    <p:sldTgt/>
-                  </p:tgtEl>
-                </p:cond>
-              </p:nextCondLst>
-            </p:seq>
-          </p:childTnLst>
-        </p:cTn>
-      </p:par>
-    </p:tnLst>
-  </p:timing>
 </p:sld>
 </file>
 

</xml_diff>